<commit_message>
Fall Review Meeting Final Presentation
</commit_message>
<xml_diff>
--- a/Presentations/Fall Review Meeting/A FRAMEWORK TO EVALUATE MARINE RESERVES IN MEXICO.pptx
+++ b/Presentations/Fall Review Meeting/A FRAMEWORK TO EVALUATE MARINE RESERVES IN MEXICO.pptx
@@ -3652,34 +3652,18 @@
                   <a:schemeClr val="bg1"/>
                 </a:solidFill>
               </a:rPr>
-              <a:t>Data </a:t>
-            </a:r>
+              <a:t>Data Collection</a:t>
+            </a:r>
+          </a:p>
+          <a:p>
+            <a:pPr lvl="1"/>
             <a:r>
               <a:rPr lang="en-US" dirty="0" smtClean="0">
                 <a:solidFill>
                   <a:schemeClr val="bg1"/>
                 </a:solidFill>
               </a:rPr>
-              <a:t>Collection</a:t>
-            </a:r>
-          </a:p>
-          <a:p>
-            <a:pPr lvl="1"/>
-            <a:r>
-              <a:rPr lang="en-US" dirty="0" smtClean="0">
-                <a:solidFill>
-                  <a:schemeClr val="bg1"/>
-                </a:solidFill>
-              </a:rPr>
-              <a:t>Started </a:t>
-            </a:r>
-            <a:r>
-              <a:rPr lang="en-US" dirty="0" smtClean="0">
-                <a:solidFill>
-                  <a:schemeClr val="bg1"/>
-                </a:solidFill>
-              </a:rPr>
-              <a:t>during Spring quarter and continued over the summer</a:t>
+              <a:t>Started during Spring quarter and continued over the Summer</a:t>
             </a:r>
           </a:p>
           <a:p>
@@ -3766,7 +3750,7 @@
                   <a:schemeClr val="bg1"/>
                 </a:solidFill>
               </a:rPr>
-              <a:t>Redefined indicators</a:t>
+              <a:t>Refined indicators</a:t>
             </a:r>
           </a:p>
           <a:p>
@@ -9643,21 +9627,6 @@
               </a:rPr>
               <a:t>Summer and Fall Progress</a:t>
             </a:r>
-            <a:br>
-              <a:rPr lang="en-US" b="1" dirty="0" smtClean="0">
-                <a:solidFill>
-                  <a:schemeClr val="bg1"/>
-                </a:solidFill>
-              </a:rPr>
-            </a:br>
-            <a:r>
-              <a:rPr lang="en-US" sz="2400" b="1" dirty="0" smtClean="0">
-                <a:solidFill>
-                  <a:schemeClr val="bg1"/>
-                </a:solidFill>
-              </a:rPr>
-              <a:t>Survey</a:t>
-            </a:r>
             <a:endParaRPr lang="en-US" sz="2400" b="1" dirty="0">
               <a:solidFill>
                 <a:schemeClr val="bg1"/>
@@ -9727,11 +9696,6 @@
               </a:rPr>
               <a:t>Final tests</a:t>
             </a:r>
-            <a:endParaRPr lang="en-US" dirty="0" smtClean="0">
-              <a:solidFill>
-                <a:schemeClr val="bg1"/>
-              </a:solidFill>
-            </a:endParaRPr>
           </a:p>
           <a:p>
             <a:endParaRPr lang="en-US" dirty="0">
@@ -9758,34 +9722,18 @@
                   <a:schemeClr val="bg1"/>
                 </a:solidFill>
               </a:rPr>
-              <a:t>Improved </a:t>
-            </a:r>
+              <a:t>Improved analysis</a:t>
+            </a:r>
+          </a:p>
+          <a:p>
+            <a:pPr lvl="1"/>
             <a:r>
               <a:rPr lang="en-US" dirty="0" smtClean="0">
                 <a:solidFill>
                   <a:schemeClr val="bg1"/>
                 </a:solidFill>
               </a:rPr>
-              <a:t>analysis</a:t>
-            </a:r>
-          </a:p>
-          <a:p>
-            <a:pPr lvl="1"/>
-            <a:r>
-              <a:rPr lang="en-US" dirty="0" smtClean="0">
-                <a:solidFill>
-                  <a:schemeClr val="bg1"/>
-                </a:solidFill>
-              </a:rPr>
-              <a:t>Governance </a:t>
-            </a:r>
-            <a:r>
-              <a:rPr lang="en-US" dirty="0" smtClean="0">
-                <a:solidFill>
-                  <a:schemeClr val="bg1"/>
-                </a:solidFill>
-              </a:rPr>
-              <a:t>indicators</a:t>
+              <a:t>Governance indicators</a:t>
             </a:r>
             <a:endParaRPr lang="en-US" dirty="0">
               <a:solidFill>
@@ -9834,6 +9782,54 @@
       </p:grpSpPr>
       <p:sp>
         <p:nvSpPr>
+          <p:cNvPr id="8" name="Retângulo 7">
+            <a:hlinkClick r:id="rId2"/>
+          </p:cNvPr>
+          <p:cNvSpPr/>
+          <p:nvPr/>
+        </p:nvSpPr>
+        <p:spPr>
+          <a:xfrm>
+            <a:off x="1479176" y="4392572"/>
+            <a:ext cx="2151530" cy="555946"/>
+          </a:xfrm>
+          <a:prstGeom prst="rect">
+            <a:avLst/>
+          </a:prstGeom>
+          <a:solidFill>
+            <a:srgbClr val="2E75B5"/>
+          </a:solidFill>
+          <a:ln>
+            <a:noFill/>
+          </a:ln>
+        </p:spPr>
+        <p:style>
+          <a:lnRef idx="2">
+            <a:schemeClr val="accent1">
+              <a:shade val="50000"/>
+            </a:schemeClr>
+          </a:lnRef>
+          <a:fillRef idx="1">
+            <a:schemeClr val="accent1"/>
+          </a:fillRef>
+          <a:effectRef idx="0">
+            <a:schemeClr val="accent1"/>
+          </a:effectRef>
+          <a:fontRef idx="minor">
+            <a:schemeClr val="lt1"/>
+          </a:fontRef>
+        </p:style>
+        <p:txBody>
+          <a:bodyPr rtlCol="0" anchor="ctr"/>
+          <a:lstStyle/>
+          <a:p>
+            <a:pPr algn="ctr"/>
+            <a:endParaRPr lang="en-US"/>
+          </a:p>
+        </p:txBody>
+      </p:sp>
+      <p:sp>
+        <p:nvSpPr>
           <p:cNvPr id="2" name="Title 1"/>
           <p:cNvSpPr>
             <a:spLocks noGrp="1"/>
@@ -9862,21 +9858,6 @@
                 </a:solidFill>
               </a:rPr>
               <a:t>Summer and Fall Progress</a:t>
-            </a:r>
-            <a:br>
-              <a:rPr lang="en-US" b="1" dirty="0" smtClean="0">
-                <a:solidFill>
-                  <a:schemeClr val="bg1"/>
-                </a:solidFill>
-              </a:rPr>
-            </a:br>
-            <a:r>
-              <a:rPr lang="en-US" sz="2400" dirty="0" smtClean="0">
-                <a:solidFill>
-                  <a:schemeClr val="bg1"/>
-                </a:solidFill>
-              </a:rPr>
-              <a:t>Outreach and Feedback</a:t>
             </a:r>
             <a:endParaRPr lang="en-US" sz="2400" b="1" dirty="0">
               <a:solidFill>
@@ -10016,8 +9997,11 @@
                   <a:schemeClr val="bg1"/>
                 </a:solidFill>
               </a:rPr>
-              <a:t>.</a:t>
-            </a:r>
+              <a:t>.		</a:t>
+            </a:r>
+          </a:p>
+          <a:p>
+            <a:pPr lvl="1"/>
             <a:endParaRPr lang="en-US" dirty="0">
               <a:solidFill>
                 <a:schemeClr val="bg1"/>
@@ -10059,7 +10043,7 @@
           <p:nvPr/>
         </p:nvPicPr>
         <p:blipFill>
-          <a:blip r:embed="rId2" cstate="print">
+          <a:blip r:embed="rId3" cstate="print">
             <a:extLst>
               <a:ext uri="{28A0092B-C50C-407E-A947-70E740481C1C}">
                 <a14:useLocalDpi xmlns:a14="http://schemas.microsoft.com/office/drawing/2010/main" val="0"/>
@@ -10089,7 +10073,7 @@
           <p:nvPr/>
         </p:nvPicPr>
         <p:blipFill>
-          <a:blip r:embed="rId3" cstate="print">
+          <a:blip r:embed="rId4" cstate="print">
             <a:extLst>
               <a:ext uri="{28A0092B-C50C-407E-A947-70E740481C1C}">
                 <a14:useLocalDpi xmlns:a14="http://schemas.microsoft.com/office/drawing/2010/main" val="0"/>
@@ -10428,7 +10412,23 @@
                   <a:schemeClr val="bg1"/>
                 </a:solidFill>
               </a:rPr>
-              <a:t>Shiny app (beta version)</a:t>
+              <a:t>Shiny app </a:t>
+            </a:r>
+            <a:r>
+              <a:rPr lang="en-US" dirty="0" smtClean="0">
+                <a:solidFill>
+                  <a:schemeClr val="bg1"/>
+                </a:solidFill>
+              </a:rPr>
+              <a:t>(Beta </a:t>
+            </a:r>
+            <a:r>
+              <a:rPr lang="en-US" dirty="0" smtClean="0">
+                <a:solidFill>
+                  <a:schemeClr val="bg1"/>
+                </a:solidFill>
+              </a:rPr>
+              <a:t>version)</a:t>
             </a:r>
           </a:p>
           <a:p>

</xml_diff>